<commit_message>
Added homework map example
</commit_message>
<xml_diff>
--- a/Lectures/Lesson 11 - Concurrency.pptx
+++ b/Lectures/Lesson 11 - Concurrency.pptx
@@ -5,7 +5,7 @@
     <p:sldMasterId id="2147483659" r:id="rId1"/>
   </p:sldMasterIdLst>
   <p:notesMasterIdLst>
-    <p:notesMasterId r:id="rId48"/>
+    <p:notesMasterId r:id="rId49"/>
   </p:notesMasterIdLst>
   <p:sldIdLst>
     <p:sldId id="256" r:id="rId2"/>
@@ -53,24 +53,25 @@
     <p:sldId id="298" r:id="rId44"/>
     <p:sldId id="299" r:id="rId45"/>
     <p:sldId id="300" r:id="rId46"/>
-    <p:sldId id="301" r:id="rId47"/>
+    <p:sldId id="302" r:id="rId47"/>
+    <p:sldId id="301" r:id="rId48"/>
   </p:sldIdLst>
   <p:sldSz cx="9144000" cy="5143500" type="screen16x9"/>
   <p:notesSz cx="6858000" cy="9144000"/>
   <p:embeddedFontLst>
     <p:embeddedFont>
       <p:font typeface="Arial Narrow" panose="020B0604020202020204" pitchFamily="34" charset="0"/>
-      <p:regular r:id="rId49"/>
-      <p:bold r:id="rId50"/>
-      <p:italic r:id="rId51"/>
-      <p:boldItalic r:id="rId52"/>
+      <p:regular r:id="rId50"/>
+      <p:bold r:id="rId51"/>
+      <p:italic r:id="rId52"/>
+      <p:boldItalic r:id="rId53"/>
     </p:embeddedFont>
     <p:embeddedFont>
       <p:font typeface="Lato" panose="020F0502020204030203" pitchFamily="34" charset="0"/>
-      <p:regular r:id="rId53"/>
-      <p:bold r:id="rId54"/>
-      <p:italic r:id="rId55"/>
-      <p:boldItalic r:id="rId56"/>
+      <p:regular r:id="rId54"/>
+      <p:bold r:id="rId55"/>
+      <p:italic r:id="rId56"/>
+      <p:boldItalic r:id="rId57"/>
     </p:embeddedFont>
   </p:embeddedFontLst>
   <p:defaultTextStyle>
@@ -5782,6 +5783,133 @@
   <p:cSld>
     <p:spTree>
       <p:nvGrpSpPr>
+        <p:cNvPr id="1" name="Shape 421"/>
+        <p:cNvGrpSpPr/>
+        <p:nvPr/>
+      </p:nvGrpSpPr>
+      <p:grpSpPr>
+        <a:xfrm>
+          <a:off x="0" y="0"/>
+          <a:ext cx="0" cy="0"/>
+          <a:chOff x="0" y="0"/>
+          <a:chExt cx="0" cy="0"/>
+        </a:xfrm>
+      </p:grpSpPr>
+      <p:sp>
+        <p:nvSpPr>
+          <p:cNvPr id="422" name="Google Shape;422;g1264a41a776_0_472:notes"/>
+          <p:cNvSpPr>
+            <a:spLocks noGrp="1" noRot="1" noChangeAspect="1"/>
+          </p:cNvSpPr>
+          <p:nvPr>
+            <p:ph type="sldImg" idx="2"/>
+          </p:nvPr>
+        </p:nvSpPr>
+        <p:spPr>
+          <a:xfrm>
+            <a:off x="381000" y="685800"/>
+            <a:ext cx="6096000" cy="3429000"/>
+          </a:xfrm>
+          <a:custGeom>
+            <a:avLst/>
+            <a:gdLst/>
+            <a:ahLst/>
+            <a:cxnLst/>
+            <a:rect l="l" t="t" r="r" b="b"/>
+            <a:pathLst>
+              <a:path w="120000" h="120000" extrusionOk="0">
+                <a:moveTo>
+                  <a:pt x="0" y="0"/>
+                </a:moveTo>
+                <a:lnTo>
+                  <a:pt x="120000" y="0"/>
+                </a:lnTo>
+                <a:lnTo>
+                  <a:pt x="120000" y="120000"/>
+                </a:lnTo>
+                <a:lnTo>
+                  <a:pt x="0" y="120000"/>
+                </a:lnTo>
+                <a:close/>
+              </a:path>
+            </a:pathLst>
+          </a:custGeom>
+          <a:noFill/>
+          <a:ln w="9525" cap="flat" cmpd="sng">
+            <a:solidFill>
+              <a:srgbClr val="000000"/>
+            </a:solidFill>
+            <a:prstDash val="solid"/>
+            <a:round/>
+            <a:headEnd type="none" w="sm" len="sm"/>
+            <a:tailEnd type="none" w="sm" len="sm"/>
+          </a:ln>
+        </p:spPr>
+      </p:sp>
+      <p:sp>
+        <p:nvSpPr>
+          <p:cNvPr id="423" name="Google Shape;423;g1264a41a776_0_472:notes"/>
+          <p:cNvSpPr txBox="1">
+            <a:spLocks noGrp="1"/>
+          </p:cNvSpPr>
+          <p:nvPr>
+            <p:ph type="body" idx="1"/>
+          </p:nvPr>
+        </p:nvSpPr>
+        <p:spPr>
+          <a:xfrm>
+            <a:off x="685800" y="4343400"/>
+            <a:ext cx="5486400" cy="4114800"/>
+          </a:xfrm>
+          <a:prstGeom prst="rect">
+            <a:avLst/>
+          </a:prstGeom>
+          <a:noFill/>
+          <a:ln>
+            <a:noFill/>
+          </a:ln>
+        </p:spPr>
+        <p:txBody>
+          <a:bodyPr spcFirstLastPara="1" wrap="square" lIns="91425" tIns="91425" rIns="91425" bIns="91425" anchor="t" anchorCtr="0">
+            <a:noAutofit/>
+          </a:bodyPr>
+          <a:lstStyle/>
+          <a:p>
+            <a:pPr marL="0" lvl="0" indent="0" algn="l" rtl="0">
+              <a:lnSpc>
+                <a:spcPct val="100000"/>
+              </a:lnSpc>
+              <a:spcBef>
+                <a:spcPts val="0"/>
+              </a:spcBef>
+              <a:spcAft>
+                <a:spcPts val="0"/>
+              </a:spcAft>
+              <a:buSzPts val="1100"/>
+              <a:buNone/>
+            </a:pPr>
+            <a:endParaRPr/>
+          </a:p>
+        </p:txBody>
+      </p:sp>
+    </p:spTree>
+    <p:extLst>
+      <p:ext uri="{BB962C8B-B14F-4D97-AF65-F5344CB8AC3E}">
+        <p14:creationId xmlns:p14="http://schemas.microsoft.com/office/powerpoint/2010/main" val="592872676"/>
+      </p:ext>
+    </p:extLst>
+  </p:cSld>
+  <p:clrMapOvr>
+    <a:masterClrMapping/>
+  </p:clrMapOvr>
+</p:notes>
+</file>
+
+<file path=ppt/notesSlides/notesSlide47.xml><?xml version="1.0" encoding="utf-8"?>
+<p:notes xmlns:a="http://schemas.openxmlformats.org/drawingml/2006/main" xmlns:r="http://schemas.openxmlformats.org/officeDocument/2006/relationships" xmlns:p="http://schemas.openxmlformats.org/presentationml/2006/main" showMasterSp="0" showMasterPhAnim="0">
+  <p:cSld>
+    <p:spTree>
+      <p:nvGrpSpPr>
         <p:cNvPr id="1" name="Shape 428"/>
         <p:cNvGrpSpPr/>
         <p:nvPr/>
@@ -5806,7 +5934,7 @@
         </p:nvSpPr>
         <p:spPr>
           <a:xfrm>
-            <a:off x="381300" y="685800"/>
+            <a:off x="381000" y="685800"/>
             <a:ext cx="6096000" cy="3429000"/>
           </a:xfrm>
           <a:custGeom>
@@ -27874,6 +28002,166 @@
   <p:cSld>
     <p:spTree>
       <p:nvGrpSpPr>
+        <p:cNvPr id="1" name="Shape 424"/>
+        <p:cNvGrpSpPr/>
+        <p:nvPr/>
+      </p:nvGrpSpPr>
+      <p:grpSpPr>
+        <a:xfrm>
+          <a:off x="0" y="0"/>
+          <a:ext cx="0" cy="0"/>
+          <a:chOff x="0" y="0"/>
+          <a:chExt cx="0" cy="0"/>
+        </a:xfrm>
+      </p:grpSpPr>
+      <p:sp>
+        <p:nvSpPr>
+          <p:cNvPr id="425" name="Google Shape;425;p57"/>
+          <p:cNvSpPr txBox="1">
+            <a:spLocks noGrp="1"/>
+          </p:cNvSpPr>
+          <p:nvPr>
+            <p:ph type="title"/>
+          </p:nvPr>
+        </p:nvSpPr>
+        <p:spPr>
+          <a:xfrm>
+            <a:off x="311700" y="445025"/>
+            <a:ext cx="8520600" cy="572700"/>
+          </a:xfrm>
+          <a:prstGeom prst="rect">
+            <a:avLst/>
+          </a:prstGeom>
+          <a:noFill/>
+          <a:ln>
+            <a:noFill/>
+          </a:ln>
+        </p:spPr>
+        <p:txBody>
+          <a:bodyPr spcFirstLastPara="1" wrap="square" lIns="91425" tIns="91425" rIns="91425" bIns="91425" anchor="t" anchorCtr="0">
+            <a:normAutofit fontScale="90000"/>
+          </a:bodyPr>
+          <a:lstStyle/>
+          <a:p>
+            <a:pPr marL="0" lvl="0" indent="0" algn="l" rtl="0">
+              <a:lnSpc>
+                <a:spcPct val="100000"/>
+              </a:lnSpc>
+              <a:spcBef>
+                <a:spcPts val="0"/>
+              </a:spcBef>
+              <a:spcAft>
+                <a:spcPts val="0"/>
+              </a:spcAft>
+              <a:buSzPct val="111111"/>
+              <a:buNone/>
+            </a:pPr>
+            <a:r>
+              <a:rPr lang="en-US" dirty="0"/>
+              <a:t>Homework map example</a:t>
+            </a:r>
+            <a:endParaRPr dirty="0"/>
+          </a:p>
+        </p:txBody>
+      </p:sp>
+      <p:sp>
+        <p:nvSpPr>
+          <p:cNvPr id="426" name="Google Shape;426;p57"/>
+          <p:cNvSpPr txBox="1">
+            <a:spLocks noGrp="1"/>
+          </p:cNvSpPr>
+          <p:nvPr>
+            <p:ph type="sldNum" idx="12"/>
+          </p:nvPr>
+        </p:nvSpPr>
+        <p:spPr>
+          <a:xfrm>
+            <a:off x="8472458" y="4663217"/>
+            <a:ext cx="548700" cy="393600"/>
+          </a:xfrm>
+          <a:prstGeom prst="rect">
+            <a:avLst/>
+          </a:prstGeom>
+          <a:noFill/>
+          <a:ln>
+            <a:noFill/>
+          </a:ln>
+        </p:spPr>
+        <p:txBody>
+          <a:bodyPr spcFirstLastPara="1" wrap="square" lIns="91425" tIns="91425" rIns="91425" bIns="91425" anchor="ctr" anchorCtr="0">
+            <a:normAutofit/>
+          </a:bodyPr>
+          <a:lstStyle/>
+          <a:p>
+            <a:pPr marL="0" lvl="0" indent="0" algn="r" rtl="0">
+              <a:lnSpc>
+                <a:spcPct val="100000"/>
+              </a:lnSpc>
+              <a:spcBef>
+                <a:spcPts val="0"/>
+              </a:spcBef>
+              <a:spcAft>
+                <a:spcPts val="0"/>
+              </a:spcAft>
+              <a:buSzPts val="1000"/>
+              <a:buNone/>
+            </a:pPr>
+            <a:fld id="{00000000-1234-1234-1234-123412341234}" type="slidenum">
+              <a:rPr lang="ru"/>
+              <a:t>46</a:t>
+            </a:fld>
+            <a:endParaRPr/>
+          </a:p>
+        </p:txBody>
+      </p:sp>
+      <p:pic>
+        <p:nvPicPr>
+          <p:cNvPr id="5" name="Picture 4">
+            <a:extLst>
+              <a:ext uri="{FF2B5EF4-FFF2-40B4-BE49-F238E27FC236}">
+                <a16:creationId xmlns:a16="http://schemas.microsoft.com/office/drawing/2014/main" id="{41E463E9-8A24-7EB2-3DC2-561CE32BD009}"/>
+              </a:ext>
+            </a:extLst>
+          </p:cNvPr>
+          <p:cNvPicPr>
+            <a:picLocks noChangeAspect="1"/>
+          </p:cNvPicPr>
+          <p:nvPr/>
+        </p:nvPicPr>
+        <p:blipFill>
+          <a:blip r:embed="rId3"/>
+          <a:stretch>
+            <a:fillRect/>
+          </a:stretch>
+        </p:blipFill>
+        <p:spPr>
+          <a:xfrm>
+            <a:off x="1556989" y="106243"/>
+            <a:ext cx="6030022" cy="4950574"/>
+          </a:xfrm>
+          <a:prstGeom prst="rect">
+            <a:avLst/>
+          </a:prstGeom>
+        </p:spPr>
+      </p:pic>
+    </p:spTree>
+    <p:extLst>
+      <p:ext uri="{BB962C8B-B14F-4D97-AF65-F5344CB8AC3E}">
+        <p14:creationId xmlns:p14="http://schemas.microsoft.com/office/powerpoint/2010/main" val="288047570"/>
+      </p:ext>
+    </p:extLst>
+  </p:cSld>
+  <p:clrMapOvr>
+    <a:masterClrMapping/>
+  </p:clrMapOvr>
+</p:sld>
+</file>
+
+<file path=ppt/slides/slide47.xml><?xml version="1.0" encoding="utf-8"?>
+<p:sld xmlns:a="http://schemas.openxmlformats.org/drawingml/2006/main" xmlns:r="http://schemas.openxmlformats.org/officeDocument/2006/relationships" xmlns:p="http://schemas.openxmlformats.org/presentationml/2006/main">
+  <p:cSld>
+    <p:spTree>
+      <p:nvGrpSpPr>
         <p:cNvPr id="1" name="Shape 431"/>
         <p:cNvGrpSpPr/>
         <p:nvPr/>
@@ -28030,7 +28318,7 @@
             </a:pPr>
             <a:fld id="{00000000-1234-1234-1234-123412341234}" type="slidenum">
               <a:rPr lang="ru"/>
-              <a:t>46</a:t>
+              <a:t>47</a:t>
             </a:fld>
             <a:endParaRPr/>
           </a:p>

</xml_diff>